<commit_message>
add wireframe finish, mockup and other elements
</commit_message>
<xml_diff>
--- a/design/grafic-charter/identité du site.pptx
+++ b/design/grafic-charter/identité du site.pptx
@@ -243,7 +243,7 @@
           <a:p>
             <a:fld id="{97C065F8-E180-49B3-A5A6-1FB32EE100AA}" type="datetimeFigureOut">
               <a:rPr lang="fr-FR" smtClean="0"/>
-              <a:t>15/02/2021</a:t>
+              <a:t>17/02/2021</a:t>
             </a:fld>
             <a:endParaRPr lang="fr-FR"/>
           </a:p>
@@ -413,7 +413,7 @@
           <a:p>
             <a:fld id="{97C065F8-E180-49B3-A5A6-1FB32EE100AA}" type="datetimeFigureOut">
               <a:rPr lang="fr-FR" smtClean="0"/>
-              <a:t>15/02/2021</a:t>
+              <a:t>17/02/2021</a:t>
             </a:fld>
             <a:endParaRPr lang="fr-FR"/>
           </a:p>
@@ -593,7 +593,7 @@
           <a:p>
             <a:fld id="{97C065F8-E180-49B3-A5A6-1FB32EE100AA}" type="datetimeFigureOut">
               <a:rPr lang="fr-FR" smtClean="0"/>
-              <a:t>15/02/2021</a:t>
+              <a:t>17/02/2021</a:t>
             </a:fld>
             <a:endParaRPr lang="fr-FR"/>
           </a:p>
@@ -763,7 +763,7 @@
           <a:p>
             <a:fld id="{97C065F8-E180-49B3-A5A6-1FB32EE100AA}" type="datetimeFigureOut">
               <a:rPr lang="fr-FR" smtClean="0"/>
-              <a:t>15/02/2021</a:t>
+              <a:t>17/02/2021</a:t>
             </a:fld>
             <a:endParaRPr lang="fr-FR"/>
           </a:p>
@@ -1007,7 +1007,7 @@
           <a:p>
             <a:fld id="{97C065F8-E180-49B3-A5A6-1FB32EE100AA}" type="datetimeFigureOut">
               <a:rPr lang="fr-FR" smtClean="0"/>
-              <a:t>15/02/2021</a:t>
+              <a:t>17/02/2021</a:t>
             </a:fld>
             <a:endParaRPr lang="fr-FR"/>
           </a:p>
@@ -1239,7 +1239,7 @@
           <a:p>
             <a:fld id="{97C065F8-E180-49B3-A5A6-1FB32EE100AA}" type="datetimeFigureOut">
               <a:rPr lang="fr-FR" smtClean="0"/>
-              <a:t>15/02/2021</a:t>
+              <a:t>17/02/2021</a:t>
             </a:fld>
             <a:endParaRPr lang="fr-FR"/>
           </a:p>
@@ -1606,7 +1606,7 @@
           <a:p>
             <a:fld id="{97C065F8-E180-49B3-A5A6-1FB32EE100AA}" type="datetimeFigureOut">
               <a:rPr lang="fr-FR" smtClean="0"/>
-              <a:t>15/02/2021</a:t>
+              <a:t>17/02/2021</a:t>
             </a:fld>
             <a:endParaRPr lang="fr-FR"/>
           </a:p>
@@ -1724,7 +1724,7 @@
           <a:p>
             <a:fld id="{97C065F8-E180-49B3-A5A6-1FB32EE100AA}" type="datetimeFigureOut">
               <a:rPr lang="fr-FR" smtClean="0"/>
-              <a:t>15/02/2021</a:t>
+              <a:t>17/02/2021</a:t>
             </a:fld>
             <a:endParaRPr lang="fr-FR"/>
           </a:p>
@@ -1819,7 +1819,7 @@
           <a:p>
             <a:fld id="{97C065F8-E180-49B3-A5A6-1FB32EE100AA}" type="datetimeFigureOut">
               <a:rPr lang="fr-FR" smtClean="0"/>
-              <a:t>15/02/2021</a:t>
+              <a:t>17/02/2021</a:t>
             </a:fld>
             <a:endParaRPr lang="fr-FR"/>
           </a:p>
@@ -2096,7 +2096,7 @@
           <a:p>
             <a:fld id="{97C065F8-E180-49B3-A5A6-1FB32EE100AA}" type="datetimeFigureOut">
               <a:rPr lang="fr-FR" smtClean="0"/>
-              <a:t>15/02/2021</a:t>
+              <a:t>17/02/2021</a:t>
             </a:fld>
             <a:endParaRPr lang="fr-FR"/>
           </a:p>
@@ -2353,7 +2353,7 @@
           <a:p>
             <a:fld id="{97C065F8-E180-49B3-A5A6-1FB32EE100AA}" type="datetimeFigureOut">
               <a:rPr lang="fr-FR" smtClean="0"/>
-              <a:t>15/02/2021</a:t>
+              <a:t>17/02/2021</a:t>
             </a:fld>
             <a:endParaRPr lang="fr-FR"/>
           </a:p>
@@ -2566,7 +2566,7 @@
           <a:p>
             <a:fld id="{97C065F8-E180-49B3-A5A6-1FB32EE100AA}" type="datetimeFigureOut">
               <a:rPr lang="fr-FR" smtClean="0"/>
-              <a:t>15/02/2021</a:t>
+              <a:t>17/02/2021</a:t>
             </a:fld>
             <a:endParaRPr lang="fr-FR"/>
           </a:p>
@@ -3115,6 +3115,92 @@
           </a:prstGeom>
         </p:spPr>
       </p:pic>
+      <p:sp>
+        <p:nvSpPr>
+          <p:cNvPr id="2" name="ZoneTexte 1">
+            <a:extLst>
+              <a:ext uri="{FF2B5EF4-FFF2-40B4-BE49-F238E27FC236}">
+                <a16:creationId xmlns:a16="http://schemas.microsoft.com/office/drawing/2014/main" id="{790AF6DD-0D3C-4263-B5B3-8A1F77C764CA}"/>
+              </a:ext>
+            </a:extLst>
+          </p:cNvPr>
+          <p:cNvSpPr txBox="1"/>
+          <p:nvPr/>
+        </p:nvSpPr>
+        <p:spPr>
+          <a:xfrm>
+            <a:off x="1680519" y="2075935"/>
+            <a:ext cx="3558746" cy="3970318"/>
+          </a:xfrm>
+          <a:prstGeom prst="rect">
+            <a:avLst/>
+          </a:prstGeom>
+          <a:noFill/>
+        </p:spPr>
+        <p:txBody>
+          <a:bodyPr wrap="square" rtlCol="0">
+            <a:spAutoFit/>
+          </a:bodyPr>
+          <a:lstStyle/>
+          <a:p>
+            <a:r>
+              <a:rPr lang="fr-FR" dirty="0"/>
+              <a:t>Accessibilité</a:t>
+            </a:r>
+          </a:p>
+          <a:p>
+            <a:r>
+              <a:rPr lang="fr-FR" dirty="0"/>
+              <a:t>A11y</a:t>
+            </a:r>
+          </a:p>
+          <a:p>
+            <a:r>
+              <a:rPr lang="fr-FR" dirty="0"/>
+              <a:t>Web</a:t>
+            </a:r>
+          </a:p>
+          <a:p>
+            <a:r>
+              <a:rPr lang="fr-FR" dirty="0"/>
+              <a:t>Numérique</a:t>
+            </a:r>
+          </a:p>
+          <a:p>
+            <a:r>
+              <a:rPr lang="fr-FR" dirty="0"/>
+              <a:t>Handicap</a:t>
+            </a:r>
+          </a:p>
+          <a:p>
+            <a:endParaRPr lang="fr-FR" dirty="0"/>
+          </a:p>
+          <a:p>
+            <a:endParaRPr lang="fr-FR" dirty="0"/>
+          </a:p>
+          <a:p>
+            <a:endParaRPr lang="fr-FR" dirty="0"/>
+          </a:p>
+          <a:p>
+            <a:endParaRPr lang="fr-FR" dirty="0"/>
+          </a:p>
+          <a:p>
+            <a:endParaRPr lang="fr-FR" dirty="0"/>
+          </a:p>
+          <a:p>
+            <a:endParaRPr lang="fr-FR" dirty="0"/>
+          </a:p>
+          <a:p>
+            <a:endParaRPr lang="fr-FR" dirty="0"/>
+          </a:p>
+          <a:p>
+            <a:endParaRPr lang="fr-FR" dirty="0"/>
+          </a:p>
+          <a:p>
+            <a:endParaRPr lang="fr-FR" dirty="0"/>
+          </a:p>
+        </p:txBody>
+      </p:sp>
     </p:spTree>
     <p:extLst>
       <p:ext uri="{BB962C8B-B14F-4D97-AF65-F5344CB8AC3E}">

</xml_diff>